<commit_message>
Compare recovery period =10 days vs 0
Simulate two trajectories under the scenarios of (1) viral interference with 10 days of recovery period that protects against any infection, and (2) no viral interference.
</commit_message>
<xml_diff>
--- a/Model/graphic.pptx
+++ b/Model/graphic.pptx
@@ -260,7 +260,7 @@
           <a:p>
             <a:fld id="{A1C2CD6F-E9A6-9746-BB05-F35338C97966}" type="datetimeFigureOut">
               <a:rPr lang="en-US" smtClean="0"/>
-              <a:t>1/5/23</a:t>
+              <a:t>1/6/23</a:t>
             </a:fld>
             <a:endParaRPr lang="en-US"/>
           </a:p>
@@ -458,7 +458,7 @@
           <a:p>
             <a:fld id="{A1C2CD6F-E9A6-9746-BB05-F35338C97966}" type="datetimeFigureOut">
               <a:rPr lang="en-US" smtClean="0"/>
-              <a:t>1/5/23</a:t>
+              <a:t>1/6/23</a:t>
             </a:fld>
             <a:endParaRPr lang="en-US"/>
           </a:p>
@@ -666,7 +666,7 @@
           <a:p>
             <a:fld id="{A1C2CD6F-E9A6-9746-BB05-F35338C97966}" type="datetimeFigureOut">
               <a:rPr lang="en-US" smtClean="0"/>
-              <a:t>1/5/23</a:t>
+              <a:t>1/6/23</a:t>
             </a:fld>
             <a:endParaRPr lang="en-US"/>
           </a:p>
@@ -864,7 +864,7 @@
           <a:p>
             <a:fld id="{A1C2CD6F-E9A6-9746-BB05-F35338C97966}" type="datetimeFigureOut">
               <a:rPr lang="en-US" smtClean="0"/>
-              <a:t>1/5/23</a:t>
+              <a:t>1/6/23</a:t>
             </a:fld>
             <a:endParaRPr lang="en-US"/>
           </a:p>
@@ -1139,7 +1139,7 @@
           <a:p>
             <a:fld id="{A1C2CD6F-E9A6-9746-BB05-F35338C97966}" type="datetimeFigureOut">
               <a:rPr lang="en-US" smtClean="0"/>
-              <a:t>1/5/23</a:t>
+              <a:t>1/6/23</a:t>
             </a:fld>
             <a:endParaRPr lang="en-US"/>
           </a:p>
@@ -1404,7 +1404,7 @@
           <a:p>
             <a:fld id="{A1C2CD6F-E9A6-9746-BB05-F35338C97966}" type="datetimeFigureOut">
               <a:rPr lang="en-US" smtClean="0"/>
-              <a:t>1/5/23</a:t>
+              <a:t>1/6/23</a:t>
             </a:fld>
             <a:endParaRPr lang="en-US"/>
           </a:p>
@@ -1816,7 +1816,7 @@
           <a:p>
             <a:fld id="{A1C2CD6F-E9A6-9746-BB05-F35338C97966}" type="datetimeFigureOut">
               <a:rPr lang="en-US" smtClean="0"/>
-              <a:t>1/5/23</a:t>
+              <a:t>1/6/23</a:t>
             </a:fld>
             <a:endParaRPr lang="en-US"/>
           </a:p>
@@ -1957,7 +1957,7 @@
           <a:p>
             <a:fld id="{A1C2CD6F-E9A6-9746-BB05-F35338C97966}" type="datetimeFigureOut">
               <a:rPr lang="en-US" smtClean="0"/>
-              <a:t>1/5/23</a:t>
+              <a:t>1/6/23</a:t>
             </a:fld>
             <a:endParaRPr lang="en-US"/>
           </a:p>
@@ -2070,7 +2070,7 @@
           <a:p>
             <a:fld id="{A1C2CD6F-E9A6-9746-BB05-F35338C97966}" type="datetimeFigureOut">
               <a:rPr lang="en-US" smtClean="0"/>
-              <a:t>1/5/23</a:t>
+              <a:t>1/6/23</a:t>
             </a:fld>
             <a:endParaRPr lang="en-US"/>
           </a:p>
@@ -2381,7 +2381,7 @@
           <a:p>
             <a:fld id="{A1C2CD6F-E9A6-9746-BB05-F35338C97966}" type="datetimeFigureOut">
               <a:rPr lang="en-US" smtClean="0"/>
-              <a:t>1/5/23</a:t>
+              <a:t>1/6/23</a:t>
             </a:fld>
             <a:endParaRPr lang="en-US"/>
           </a:p>
@@ -2669,7 +2669,7 @@
           <a:p>
             <a:fld id="{A1C2CD6F-E9A6-9746-BB05-F35338C97966}" type="datetimeFigureOut">
               <a:rPr lang="en-US" smtClean="0"/>
-              <a:t>1/5/23</a:t>
+              <a:t>1/6/23</a:t>
             </a:fld>
             <a:endParaRPr lang="en-US"/>
           </a:p>
@@ -2910,7 +2910,7 @@
           <a:p>
             <a:fld id="{A1C2CD6F-E9A6-9746-BB05-F35338C97966}" type="datetimeFigureOut">
               <a:rPr lang="en-US" smtClean="0"/>
-              <a:t>1/5/23</a:t>
+              <a:t>1/6/23</a:t>
             </a:fld>
             <a:endParaRPr lang="en-US"/>
           </a:p>
@@ -4726,8 +4726,8 @@
           </a:fontRef>
         </p:style>
       </p:cxnSp>
-      <mc:AlternateContent xmlns:mc="http://schemas.openxmlformats.org/markup-compatibility/2006">
-        <mc:Choice xmlns:a14="http://schemas.microsoft.com/office/drawing/2010/main" Requires="a14">
+      <mc:AlternateContent xmlns:mc="http://schemas.openxmlformats.org/markup-compatibility/2006" xmlns:a14="http://schemas.microsoft.com/office/drawing/2010/main">
+        <mc:Choice Requires="a14">
           <p:sp>
             <p:nvSpPr>
               <p:cNvPr id="52" name="TextBox 51">
@@ -5043,7 +5043,7 @@
             </p:txBody>
           </p:sp>
         </mc:Choice>
-        <mc:Fallback>
+        <mc:Fallback xmlns="">
           <p:sp>
             <p:nvSpPr>
               <p:cNvPr id="52" name="TextBox 51">
@@ -5088,8 +5088,8 @@
           </p:sp>
         </mc:Fallback>
       </mc:AlternateContent>
-      <mc:AlternateContent xmlns:mc="http://schemas.openxmlformats.org/markup-compatibility/2006">
-        <mc:Choice xmlns:a14="http://schemas.microsoft.com/office/drawing/2010/main" Requires="a14">
+      <mc:AlternateContent xmlns:mc="http://schemas.openxmlformats.org/markup-compatibility/2006" xmlns:a14="http://schemas.microsoft.com/office/drawing/2010/main">
+        <mc:Choice Requires="a14">
           <p:sp>
             <p:nvSpPr>
               <p:cNvPr id="53" name="TextBox 52">
@@ -5369,7 +5369,7 @@
             </p:txBody>
           </p:sp>
         </mc:Choice>
-        <mc:Fallback>
+        <mc:Fallback xmlns="">
           <p:sp>
             <p:nvSpPr>
               <p:cNvPr id="53" name="TextBox 52">
@@ -5414,8 +5414,8 @@
           </p:sp>
         </mc:Fallback>
       </mc:AlternateContent>
-      <mc:AlternateContent xmlns:mc="http://schemas.openxmlformats.org/markup-compatibility/2006">
-        <mc:Choice xmlns:a14="http://schemas.microsoft.com/office/drawing/2010/main" Requires="a14">
+      <mc:AlternateContent xmlns:mc="http://schemas.openxmlformats.org/markup-compatibility/2006" xmlns:a14="http://schemas.microsoft.com/office/drawing/2010/main">
+        <mc:Choice Requires="a14">
           <p:sp>
             <p:nvSpPr>
               <p:cNvPr id="54" name="TextBox 53">
@@ -5629,7 +5629,7 @@
             </p:txBody>
           </p:sp>
         </mc:Choice>
-        <mc:Fallback>
+        <mc:Fallback xmlns="">
           <p:sp>
             <p:nvSpPr>
               <p:cNvPr id="54" name="TextBox 53">
@@ -5674,8 +5674,8 @@
           </p:sp>
         </mc:Fallback>
       </mc:AlternateContent>
-      <mc:AlternateContent xmlns:mc="http://schemas.openxmlformats.org/markup-compatibility/2006">
-        <mc:Choice xmlns:a14="http://schemas.microsoft.com/office/drawing/2010/main" Requires="a14">
+      <mc:AlternateContent xmlns:mc="http://schemas.openxmlformats.org/markup-compatibility/2006" xmlns:a14="http://schemas.microsoft.com/office/drawing/2010/main">
+        <mc:Choice Requires="a14">
           <p:sp>
             <p:nvSpPr>
               <p:cNvPr id="55" name="TextBox 54">
@@ -5883,7 +5883,7 @@
             </p:txBody>
           </p:sp>
         </mc:Choice>
-        <mc:Fallback>
+        <mc:Fallback xmlns="">
           <p:sp>
             <p:nvSpPr>
               <p:cNvPr id="55" name="TextBox 54">
@@ -6153,7 +6153,21 @@
                                   <a:latin typeface="Cambria Math" panose="02040503050406030204" pitchFamily="18" charset="0"/>
                                   <a:ea typeface="Cambria Math" panose="02040503050406030204" pitchFamily="18" charset="0"/>
                                 </a:rPr>
-                                <m:t>2,1</m:t>
+                                <m:t>1</m:t>
+                              </m:r>
+                              <m:r>
+                                <a:rPr lang="en-US" sz="1050" b="0" i="1" smtClean="0">
+                                  <a:latin typeface="Cambria Math" panose="02040503050406030204" pitchFamily="18" charset="0"/>
+                                  <a:ea typeface="Cambria Math" panose="02040503050406030204" pitchFamily="18" charset="0"/>
+                                </a:rPr>
+                                <m:t>,</m:t>
+                              </m:r>
+                              <m:r>
+                                <a:rPr lang="en-US" sz="1050" b="0" i="1" smtClean="0">
+                                  <a:latin typeface="Cambria Math" panose="02040503050406030204" pitchFamily="18" charset="0"/>
+                                  <a:ea typeface="Cambria Math" panose="02040503050406030204" pitchFamily="18" charset="0"/>
+                                </a:rPr>
+                                <m:t>2</m:t>
                               </m:r>
                             </m:sub>
                           </m:sSub>
@@ -6500,7 +6514,14 @@
                                   <a:latin typeface="Cambria Math" panose="02040503050406030204" pitchFamily="18" charset="0"/>
                                   <a:ea typeface="Cambria Math" panose="02040503050406030204" pitchFamily="18" charset="0"/>
                                 </a:rPr>
-                                <m:t>2,1</m:t>
+                                <m:t>1,</m:t>
+                              </m:r>
+                              <m:r>
+                                <a:rPr lang="en-US" sz="1050" b="0" i="1" smtClean="0">
+                                  <a:latin typeface="Cambria Math" panose="02040503050406030204" pitchFamily="18" charset="0"/>
+                                  <a:ea typeface="Cambria Math" panose="02040503050406030204" pitchFamily="18" charset="0"/>
+                                </a:rPr>
+                                <m:t>2</m:t>
                               </m:r>
                             </m:sub>
                           </m:sSub>
@@ -6622,8 +6643,8 @@
           </p:sp>
         </mc:Fallback>
       </mc:AlternateContent>
-      <mc:AlternateContent xmlns:mc="http://schemas.openxmlformats.org/markup-compatibility/2006">
-        <mc:Choice xmlns:a14="http://schemas.microsoft.com/office/drawing/2010/main" Requires="a14">
+      <mc:AlternateContent xmlns:mc="http://schemas.openxmlformats.org/markup-compatibility/2006" xmlns:a14="http://schemas.microsoft.com/office/drawing/2010/main">
+        <mc:Choice Requires="a14">
           <p:sp>
             <p:nvSpPr>
               <p:cNvPr id="59" name="TextBox 58">
@@ -6842,7 +6863,7 @@
             </p:txBody>
           </p:sp>
         </mc:Choice>
-        <mc:Fallback>
+        <mc:Fallback xmlns="">
           <p:sp>
             <p:nvSpPr>
               <p:cNvPr id="59" name="TextBox 58">
@@ -6887,8 +6908,8 @@
           </p:sp>
         </mc:Fallback>
       </mc:AlternateContent>
-      <mc:AlternateContent xmlns:mc="http://schemas.openxmlformats.org/markup-compatibility/2006">
-        <mc:Choice xmlns:a14="http://schemas.microsoft.com/office/drawing/2010/main" Requires="a14">
+      <mc:AlternateContent xmlns:mc="http://schemas.openxmlformats.org/markup-compatibility/2006" xmlns:a14="http://schemas.microsoft.com/office/drawing/2010/main">
+        <mc:Choice Requires="a14">
           <p:sp>
             <p:nvSpPr>
               <p:cNvPr id="61" name="TextBox 60">
@@ -7168,7 +7189,7 @@
             </p:txBody>
           </p:sp>
         </mc:Choice>
-        <mc:Fallback>
+        <mc:Fallback xmlns="">
           <p:sp>
             <p:nvSpPr>
               <p:cNvPr id="61" name="TextBox 60">
@@ -7213,8 +7234,8 @@
           </p:sp>
         </mc:Fallback>
       </mc:AlternateContent>
-      <mc:AlternateContent xmlns:mc="http://schemas.openxmlformats.org/markup-compatibility/2006">
-        <mc:Choice xmlns:a14="http://schemas.microsoft.com/office/drawing/2010/main" Requires="a14">
+      <mc:AlternateContent xmlns:mc="http://schemas.openxmlformats.org/markup-compatibility/2006" xmlns:a14="http://schemas.microsoft.com/office/drawing/2010/main">
+        <mc:Choice Requires="a14">
           <p:sp>
             <p:nvSpPr>
               <p:cNvPr id="62" name="TextBox 61">
@@ -7431,7 +7452,7 @@
             </p:txBody>
           </p:sp>
         </mc:Choice>
-        <mc:Fallback>
+        <mc:Fallback xmlns="">
           <p:sp>
             <p:nvSpPr>
               <p:cNvPr id="62" name="TextBox 61">
@@ -7476,8 +7497,8 @@
           </p:sp>
         </mc:Fallback>
       </mc:AlternateContent>
-      <mc:AlternateContent xmlns:mc="http://schemas.openxmlformats.org/markup-compatibility/2006">
-        <mc:Choice xmlns:a14="http://schemas.microsoft.com/office/drawing/2010/main" Requires="a14">
+      <mc:AlternateContent xmlns:mc="http://schemas.openxmlformats.org/markup-compatibility/2006" xmlns:a14="http://schemas.microsoft.com/office/drawing/2010/main">
+        <mc:Choice Requires="a14">
           <p:sp>
             <p:nvSpPr>
               <p:cNvPr id="63" name="TextBox 62">
@@ -7685,7 +7706,7 @@
             </p:txBody>
           </p:sp>
         </mc:Choice>
-        <mc:Fallback>
+        <mc:Fallback xmlns="">
           <p:sp>
             <p:nvSpPr>
               <p:cNvPr id="63" name="TextBox 62">
@@ -7955,7 +7976,21 @@
                                   <a:latin typeface="Cambria Math" panose="02040503050406030204" pitchFamily="18" charset="0"/>
                                   <a:ea typeface="Cambria Math" panose="02040503050406030204" pitchFamily="18" charset="0"/>
                                 </a:rPr>
-                                <m:t>1,2</m:t>
+                                <m:t>2</m:t>
+                              </m:r>
+                              <m:r>
+                                <a:rPr lang="en-US" sz="1050" b="0" i="1" smtClean="0">
+                                  <a:latin typeface="Cambria Math" panose="02040503050406030204" pitchFamily="18" charset="0"/>
+                                  <a:ea typeface="Cambria Math" panose="02040503050406030204" pitchFamily="18" charset="0"/>
+                                </a:rPr>
+                                <m:t>,</m:t>
+                              </m:r>
+                              <m:r>
+                                <a:rPr lang="en-US" sz="1050" b="0" i="1" smtClean="0">
+                                  <a:latin typeface="Cambria Math" panose="02040503050406030204" pitchFamily="18" charset="0"/>
+                                  <a:ea typeface="Cambria Math" panose="02040503050406030204" pitchFamily="18" charset="0"/>
+                                </a:rPr>
+                                <m:t>1</m:t>
                               </m:r>
                             </m:sub>
                           </m:sSub>
@@ -8150,7 +8185,19 @@
                                 <a:rPr lang="en-US" sz="1050" b="0" i="1" smtClean="0">
                                   <a:latin typeface="Cambria Math" panose="02040503050406030204" pitchFamily="18" charset="0"/>
                                 </a:rPr>
-                                <m:t>1,2</m:t>
+                                <m:t>2</m:t>
+                              </m:r>
+                              <m:r>
+                                <a:rPr lang="en-US" sz="1050" b="0" i="1" smtClean="0">
+                                  <a:latin typeface="Cambria Math" panose="02040503050406030204" pitchFamily="18" charset="0"/>
+                                </a:rPr>
+                                <m:t>,</m:t>
+                              </m:r>
+                              <m:r>
+                                <a:rPr lang="en-US" sz="1050" b="0" i="1" smtClean="0">
+                                  <a:latin typeface="Cambria Math" panose="02040503050406030204" pitchFamily="18" charset="0"/>
+                                </a:rPr>
+                                <m:t>1</m:t>
                               </m:r>
                             </m:sub>
                           </m:sSub>
@@ -8302,7 +8349,14 @@
                                   <a:latin typeface="Cambria Math" panose="02040503050406030204" pitchFamily="18" charset="0"/>
                                   <a:ea typeface="Cambria Math" panose="02040503050406030204" pitchFamily="18" charset="0"/>
                                 </a:rPr>
-                                <m:t>1,2</m:t>
+                                <m:t>2,</m:t>
+                              </m:r>
+                              <m:r>
+                                <a:rPr lang="en-US" sz="1050" b="0" i="1" smtClean="0">
+                                  <a:latin typeface="Cambria Math" panose="02040503050406030204" pitchFamily="18" charset="0"/>
+                                  <a:ea typeface="Cambria Math" panose="02040503050406030204" pitchFamily="18" charset="0"/>
+                                </a:rPr>
+                                <m:t>1</m:t>
                               </m:r>
                             </m:sub>
                           </m:sSub>
@@ -8424,8 +8478,8 @@
           </p:sp>
         </mc:Fallback>
       </mc:AlternateContent>
-      <mc:AlternateContent xmlns:mc="http://schemas.openxmlformats.org/markup-compatibility/2006">
-        <mc:Choice xmlns:a14="http://schemas.microsoft.com/office/drawing/2010/main" Requires="a14">
+      <mc:AlternateContent xmlns:mc="http://schemas.openxmlformats.org/markup-compatibility/2006" xmlns:a14="http://schemas.microsoft.com/office/drawing/2010/main">
+        <mc:Choice Requires="a14">
           <p:sp>
             <p:nvSpPr>
               <p:cNvPr id="66" name="TextBox 65">
@@ -8644,7 +8698,7 @@
             </p:txBody>
           </p:sp>
         </mc:Choice>
-        <mc:Fallback>
+        <mc:Fallback xmlns="">
           <p:sp>
             <p:nvSpPr>
               <p:cNvPr id="66" name="TextBox 65">
@@ -8689,8 +8743,8 @@
           </p:sp>
         </mc:Fallback>
       </mc:AlternateContent>
-      <mc:AlternateContent xmlns:mc="http://schemas.openxmlformats.org/markup-compatibility/2006">
-        <mc:Choice xmlns:a14="http://schemas.microsoft.com/office/drawing/2010/main" Requires="a14">
+      <mc:AlternateContent xmlns:mc="http://schemas.openxmlformats.org/markup-compatibility/2006" xmlns:a14="http://schemas.microsoft.com/office/drawing/2010/main">
+        <mc:Choice Requires="a14">
           <p:sp>
             <p:nvSpPr>
               <p:cNvPr id="67" name="TextBox 66">
@@ -8884,7 +8938,7 @@
             </p:txBody>
           </p:sp>
         </mc:Choice>
-        <mc:Fallback>
+        <mc:Fallback xmlns="">
           <p:sp>
             <p:nvSpPr>
               <p:cNvPr id="67" name="TextBox 66">
@@ -10225,8 +10279,8 @@
           </a:fontRef>
         </p:style>
       </p:cxnSp>
-      <mc:AlternateContent xmlns:mc="http://schemas.openxmlformats.org/markup-compatibility/2006" xmlns:a14="http://schemas.microsoft.com/office/drawing/2010/main">
-        <mc:Choice Requires="a14">
+      <mc:AlternateContent xmlns:mc="http://schemas.openxmlformats.org/markup-compatibility/2006">
+        <mc:Choice xmlns:a14="http://schemas.microsoft.com/office/drawing/2010/main" Requires="a14">
           <p:sp>
             <p:nvSpPr>
               <p:cNvPr id="107" name="TextBox 106">
@@ -10394,7 +10448,21 @@
                                   <a:latin typeface="Cambria Math" panose="02040503050406030204" pitchFamily="18" charset="0"/>
                                   <a:ea typeface="Cambria Math" panose="02040503050406030204" pitchFamily="18" charset="0"/>
                                 </a:rPr>
-                                <m:t>1,2</m:t>
+                                <m:t>2</m:t>
+                              </m:r>
+                              <m:r>
+                                <a:rPr lang="en-US" sz="1050" b="0" i="1" smtClean="0">
+                                  <a:latin typeface="Cambria Math" panose="02040503050406030204" pitchFamily="18" charset="0"/>
+                                  <a:ea typeface="Cambria Math" panose="02040503050406030204" pitchFamily="18" charset="0"/>
+                                </a:rPr>
+                                <m:t>,</m:t>
+                              </m:r>
+                              <m:r>
+                                <a:rPr lang="en-US" sz="1050" b="0" i="1" smtClean="0">
+                                  <a:latin typeface="Cambria Math" panose="02040503050406030204" pitchFamily="18" charset="0"/>
+                                  <a:ea typeface="Cambria Math" panose="02040503050406030204" pitchFamily="18" charset="0"/>
+                                </a:rPr>
+                                <m:t>1</m:t>
                               </m:r>
                             </m:sub>
                           </m:sSub>
@@ -10408,7 +10476,7 @@
             </p:txBody>
           </p:sp>
         </mc:Choice>
-        <mc:Fallback xmlns="">
+        <mc:Fallback>
           <p:sp>
             <p:nvSpPr>
               <p:cNvPr id="107" name="TextBox 106">
@@ -10453,8 +10521,8 @@
           </p:sp>
         </mc:Fallback>
       </mc:AlternateContent>
-      <mc:AlternateContent xmlns:mc="http://schemas.openxmlformats.org/markup-compatibility/2006" xmlns:a14="http://schemas.microsoft.com/office/drawing/2010/main">
-        <mc:Choice Requires="a14">
+      <mc:AlternateContent xmlns:mc="http://schemas.openxmlformats.org/markup-compatibility/2006">
+        <mc:Choice xmlns:a14="http://schemas.microsoft.com/office/drawing/2010/main" Requires="a14">
           <p:sp>
             <p:nvSpPr>
               <p:cNvPr id="109" name="TextBox 108">
@@ -10622,7 +10690,7 @@
                                   <a:latin typeface="Cambria Math" panose="02040503050406030204" pitchFamily="18" charset="0"/>
                                   <a:ea typeface="Cambria Math" panose="02040503050406030204" pitchFamily="18" charset="0"/>
                                 </a:rPr>
-                                <m:t>2,1</m:t>
+                                <m:t>1,2</m:t>
                               </m:r>
                             </m:sub>
                           </m:sSub>
@@ -10636,7 +10704,7 @@
             </p:txBody>
           </p:sp>
         </mc:Choice>
-        <mc:Fallback xmlns="">
+        <mc:Fallback>
           <p:sp>
             <p:nvSpPr>
               <p:cNvPr id="109" name="TextBox 108">
@@ -12049,8 +12117,8 @@
           </p:sp>
         </mc:Fallback>
       </mc:AlternateContent>
-      <mc:AlternateContent xmlns:mc="http://schemas.openxmlformats.org/markup-compatibility/2006">
-        <mc:Choice xmlns:a14="http://schemas.microsoft.com/office/drawing/2010/main" Requires="a14">
+      <mc:AlternateContent xmlns:mc="http://schemas.openxmlformats.org/markup-compatibility/2006" xmlns:a14="http://schemas.microsoft.com/office/drawing/2010/main">
+        <mc:Choice Requires="a14">
           <p:sp>
             <p:nvSpPr>
               <p:cNvPr id="2" name="TextBox 1">
@@ -12123,7 +12191,7 @@
             </p:txBody>
           </p:sp>
         </mc:Choice>
-        <mc:Fallback>
+        <mc:Fallback xmlns="">
           <p:sp>
             <p:nvSpPr>
               <p:cNvPr id="2" name="TextBox 1">
@@ -12168,8 +12236,8 @@
           </p:sp>
         </mc:Fallback>
       </mc:AlternateContent>
-      <mc:AlternateContent xmlns:mc="http://schemas.openxmlformats.org/markup-compatibility/2006">
-        <mc:Choice xmlns:a14="http://schemas.microsoft.com/office/drawing/2010/main" Requires="a14">
+      <mc:AlternateContent xmlns:mc="http://schemas.openxmlformats.org/markup-compatibility/2006" xmlns:a14="http://schemas.microsoft.com/office/drawing/2010/main">
+        <mc:Choice Requires="a14">
           <p:sp>
             <p:nvSpPr>
               <p:cNvPr id="3" name="TextBox 2">
@@ -12242,7 +12310,7 @@
             </p:txBody>
           </p:sp>
         </mc:Choice>
-        <mc:Fallback>
+        <mc:Fallback xmlns="">
           <p:sp>
             <p:nvSpPr>
               <p:cNvPr id="3" name="TextBox 2">

</xml_diff>